<commit_message>
replace trelp with skay
</commit_message>
<xml_diff>
--- a/01_CategoryTraining/imgsscaled/stimImagesRaw.pptx
+++ b/01_CategoryTraining/imgsscaled/stimImagesRaw.pptx
@@ -296,7 +296,7 @@
           <a:p>
             <a:fld id="{0135D9A1-5BA5-E74D-8E15-3553131FB7A8}" type="datetimeFigureOut">
               <a:rPr lang="en-US" smtClean="0"/>
-              <a:t>2/23/16</a:t>
+              <a:t>5/25/16</a:t>
             </a:fld>
             <a:endParaRPr lang="en-US"/>
           </a:p>
@@ -466,7 +466,7 @@
           <a:p>
             <a:fld id="{0135D9A1-5BA5-E74D-8E15-3553131FB7A8}" type="datetimeFigureOut">
               <a:rPr lang="en-US" smtClean="0"/>
-              <a:t>2/23/16</a:t>
+              <a:t>5/25/16</a:t>
             </a:fld>
             <a:endParaRPr lang="en-US"/>
           </a:p>
@@ -646,7 +646,7 @@
           <a:p>
             <a:fld id="{0135D9A1-5BA5-E74D-8E15-3553131FB7A8}" type="datetimeFigureOut">
               <a:rPr lang="en-US" smtClean="0"/>
-              <a:t>2/23/16</a:t>
+              <a:t>5/25/16</a:t>
             </a:fld>
             <a:endParaRPr lang="en-US"/>
           </a:p>
@@ -816,7 +816,7 @@
           <a:p>
             <a:fld id="{0135D9A1-5BA5-E74D-8E15-3553131FB7A8}" type="datetimeFigureOut">
               <a:rPr lang="en-US" smtClean="0"/>
-              <a:t>2/23/16</a:t>
+              <a:t>5/25/16</a:t>
             </a:fld>
             <a:endParaRPr lang="en-US"/>
           </a:p>
@@ -1062,7 +1062,7 @@
           <a:p>
             <a:fld id="{0135D9A1-5BA5-E74D-8E15-3553131FB7A8}" type="datetimeFigureOut">
               <a:rPr lang="en-US" smtClean="0"/>
-              <a:t>2/23/16</a:t>
+              <a:t>5/25/16</a:t>
             </a:fld>
             <a:endParaRPr lang="en-US"/>
           </a:p>
@@ -1350,7 +1350,7 @@
           <a:p>
             <a:fld id="{0135D9A1-5BA5-E74D-8E15-3553131FB7A8}" type="datetimeFigureOut">
               <a:rPr lang="en-US" smtClean="0"/>
-              <a:t>2/23/16</a:t>
+              <a:t>5/25/16</a:t>
             </a:fld>
             <a:endParaRPr lang="en-US"/>
           </a:p>
@@ -1772,7 +1772,7 @@
           <a:p>
             <a:fld id="{0135D9A1-5BA5-E74D-8E15-3553131FB7A8}" type="datetimeFigureOut">
               <a:rPr lang="en-US" smtClean="0"/>
-              <a:t>2/23/16</a:t>
+              <a:t>5/25/16</a:t>
             </a:fld>
             <a:endParaRPr lang="en-US"/>
           </a:p>
@@ -1890,7 +1890,7 @@
           <a:p>
             <a:fld id="{0135D9A1-5BA5-E74D-8E15-3553131FB7A8}" type="datetimeFigureOut">
               <a:rPr lang="en-US" smtClean="0"/>
-              <a:t>2/23/16</a:t>
+              <a:t>5/25/16</a:t>
             </a:fld>
             <a:endParaRPr lang="en-US"/>
           </a:p>
@@ -1985,7 +1985,7 @@
           <a:p>
             <a:fld id="{0135D9A1-5BA5-E74D-8E15-3553131FB7A8}" type="datetimeFigureOut">
               <a:rPr lang="en-US" smtClean="0"/>
-              <a:t>2/23/16</a:t>
+              <a:t>5/25/16</a:t>
             </a:fld>
             <a:endParaRPr lang="en-US"/>
           </a:p>
@@ -2262,7 +2262,7 @@
           <a:p>
             <a:fld id="{0135D9A1-5BA5-E74D-8E15-3553131FB7A8}" type="datetimeFigureOut">
               <a:rPr lang="en-US" smtClean="0"/>
-              <a:t>2/23/16</a:t>
+              <a:t>5/25/16</a:t>
             </a:fld>
             <a:endParaRPr lang="en-US"/>
           </a:p>
@@ -2515,7 +2515,7 @@
           <a:p>
             <a:fld id="{0135D9A1-5BA5-E74D-8E15-3553131FB7A8}" type="datetimeFigureOut">
               <a:rPr lang="en-US" smtClean="0"/>
-              <a:t>2/23/16</a:t>
+              <a:t>5/25/16</a:t>
             </a:fld>
             <a:endParaRPr lang="en-US"/>
           </a:p>
@@ -2728,7 +2728,7 @@
           <a:p>
             <a:fld id="{0135D9A1-5BA5-E74D-8E15-3553131FB7A8}" type="datetimeFigureOut">
               <a:rPr lang="en-US" smtClean="0"/>
-              <a:t>2/23/16</a:t>
+              <a:t>5/25/16</a:t>
             </a:fld>
             <a:endParaRPr lang="en-US"/>
           </a:p>
@@ -3171,7 +3171,7 @@
           <a:p>
             <a:r>
               <a:rPr lang="en-US" sz="6000" dirty="0" err="1" smtClean="0"/>
-              <a:t>Trelp</a:t>
+              <a:t>Skay</a:t>
             </a:r>
             <a:endParaRPr lang="en-US" sz="6000" dirty="0"/>
           </a:p>
@@ -3275,7 +3275,7 @@
           <a:p>
             <a:r>
               <a:rPr lang="en-US" sz="6000" dirty="0" err="1" smtClean="0"/>
-              <a:t>Trelp</a:t>
+              <a:t>Skay</a:t>
             </a:r>
             <a:endParaRPr lang="en-US" sz="6000" dirty="0"/>
           </a:p>
@@ -3428,7 +3428,7 @@
           <a:p>
             <a:r>
               <a:rPr lang="en-US" sz="6000" dirty="0" err="1" smtClean="0"/>
-              <a:t>Trelp</a:t>
+              <a:t>Skay</a:t>
             </a:r>
             <a:endParaRPr lang="en-US" sz="6000" dirty="0"/>
           </a:p>
@@ -3581,7 +3581,7 @@
           <a:p>
             <a:r>
               <a:rPr lang="en-US" sz="6000" dirty="0" err="1" smtClean="0"/>
-              <a:t>Trelp</a:t>
+              <a:t>Skay</a:t>
             </a:r>
             <a:endParaRPr lang="en-US" sz="6000" dirty="0"/>
           </a:p>
@@ -3685,7 +3685,7 @@
           <a:p>
             <a:r>
               <a:rPr lang="en-US" sz="6000" dirty="0" err="1" smtClean="0"/>
-              <a:t>Trelp</a:t>
+              <a:t>Skay</a:t>
             </a:r>
             <a:endParaRPr lang="en-US" sz="6000" dirty="0"/>
           </a:p>
@@ -3838,7 +3838,7 @@
           <a:p>
             <a:r>
               <a:rPr lang="en-US" sz="6000" dirty="0" err="1" smtClean="0"/>
-              <a:t>Trelp</a:t>
+              <a:t>Skay</a:t>
             </a:r>
             <a:endParaRPr lang="en-US" sz="6000" dirty="0"/>
           </a:p>
@@ -3991,7 +3991,7 @@
           <a:p>
             <a:r>
               <a:rPr lang="en-US" sz="6000" dirty="0" err="1" smtClean="0"/>
-              <a:t>Trelp</a:t>
+              <a:t>Skay</a:t>
             </a:r>
             <a:endParaRPr lang="en-US" sz="6000" dirty="0"/>
           </a:p>
@@ -4278,7 +4278,7 @@
           <a:p>
             <a:r>
               <a:rPr lang="en-US" sz="6000" dirty="0" err="1" smtClean="0"/>
-              <a:t>Trelp</a:t>
+              <a:t>Skay</a:t>
             </a:r>
             <a:endParaRPr lang="en-US" sz="6000" dirty="0"/>
           </a:p>

</xml_diff>